<commit_message>
added 'Program Structure Follows Data Structure' in L4.1,2,3'
</commit_message>
<xml_diff>
--- a/Slides/Lesson 4.1 Lists.pptx
+++ b/Slides/Lesson 4.1 Lists.pptx
@@ -5088,7 +5088,7 @@
             <a:fld id="{CF8F25F6-E1EF-4065-8525-42EDEBD9BD22}" type="datetimeFigureOut">
               <a:rPr lang="en-US" smtClean="0"/>
               <a:pPr/>
-              <a:t>8/4/2017</a:t>
+              <a:t>8/6/2017</a:t>
             </a:fld>
             <a:endParaRPr lang="en-US"/>
           </a:p>
@@ -6241,7 +6241,7 @@
           <a:p>
             <a:fld id="{2F1F79F5-7BEC-496A-AFC7-876E38F64D71}" type="datetime1">
               <a:rPr lang="en-US" smtClean="0"/>
-              <a:t>8/4/2017</a:t>
+              <a:t>8/6/2017</a:t>
             </a:fld>
             <a:endParaRPr lang="en-US"/>
           </a:p>
@@ -6336,7 +6336,7 @@
           <a:p>
             <a:fld id="{0A05703A-7669-4FEA-9056-25299B4D29D4}" type="datetime1">
               <a:rPr lang="en-US" smtClean="0"/>
-              <a:t>8/4/2017</a:t>
+              <a:t>8/6/2017</a:t>
             </a:fld>
             <a:endParaRPr lang="en-US"/>
           </a:p>
@@ -6611,7 +6611,7 @@
           <a:p>
             <a:fld id="{6E5077B5-BB57-49DB-88CA-226A139E5C01}" type="datetime1">
               <a:rPr lang="en-US" smtClean="0"/>
-              <a:t>8/4/2017</a:t>
+              <a:t>8/6/2017</a:t>
             </a:fld>
             <a:endParaRPr lang="en-US"/>
           </a:p>
@@ -6863,7 +6863,7 @@
           <a:p>
             <a:fld id="{C48D9447-CBD6-49A1-89FD-8512A8CF8999}" type="datetime1">
               <a:rPr lang="en-US" smtClean="0"/>
-              <a:t>8/4/2017</a:t>
+              <a:t>8/6/2017</a:t>
             </a:fld>
             <a:endParaRPr lang="en-US"/>
           </a:p>
@@ -7031,7 +7031,7 @@
           <a:p>
             <a:fld id="{A3639A2A-823D-48B7-9ACE-7FAF42870BA9}" type="datetime1">
               <a:rPr lang="en-US" smtClean="0"/>
-              <a:t>8/4/2017</a:t>
+              <a:t>8/6/2017</a:t>
             </a:fld>
             <a:endParaRPr lang="en-US"/>
           </a:p>
@@ -7209,7 +7209,7 @@
           <a:p>
             <a:fld id="{ED1B6996-82E9-463C-972C-7B56056E426C}" type="datetime1">
               <a:rPr lang="en-US" smtClean="0"/>
-              <a:t>8/4/2017</a:t>
+              <a:t>8/6/2017</a:t>
             </a:fld>
             <a:endParaRPr lang="en-US"/>
           </a:p>
@@ -7383,7 +7383,7 @@
           <a:p>
             <a:fld id="{E22ED4DA-448D-4BB1-B935-CC112220207B}" type="datetime1">
               <a:rPr lang="en-US" smtClean="0"/>
-              <a:t>8/4/2017</a:t>
+              <a:t>8/6/2017</a:t>
             </a:fld>
             <a:endParaRPr lang="en-US"/>
           </a:p>
@@ -7556,7 +7556,7 @@
           <a:p>
             <a:fld id="{E22ED4DA-448D-4BB1-B935-CC112220207B}" type="datetime1">
               <a:rPr lang="en-US" smtClean="0"/>
-              <a:t>8/4/2017</a:t>
+              <a:t>8/6/2017</a:t>
             </a:fld>
             <a:endParaRPr lang="en-US"/>
           </a:p>
@@ -7816,7 +7816,7 @@
           <a:p>
             <a:fld id="{FF5D65A6-AB94-4435-B0B7-3743215FA46C}" type="datetime1">
               <a:rPr lang="en-US" smtClean="0"/>
-              <a:t>8/4/2017</a:t>
+              <a:t>8/6/2017</a:t>
             </a:fld>
             <a:endParaRPr lang="en-US"/>
           </a:p>
@@ -7992,7 +7992,7 @@
           <a:p>
             <a:fld id="{FF5D65A6-AB94-4435-B0B7-3743215FA46C}" type="datetime1">
               <a:rPr lang="en-US" smtClean="0"/>
-              <a:t>8/4/2017</a:t>
+              <a:t>8/6/2017</a:t>
             </a:fld>
             <a:endParaRPr lang="en-US"/>
           </a:p>
@@ -8286,7 +8286,7 @@
           <a:p>
             <a:fld id="{7C193DC4-6EF0-48C9-B29C-616106A645E1}" type="datetime1">
               <a:rPr lang="en-US" smtClean="0"/>
-              <a:t>8/4/2017</a:t>
+              <a:t>8/6/2017</a:t>
             </a:fld>
             <a:endParaRPr lang="en-US"/>
           </a:p>
@@ -8571,7 +8571,7 @@
           <a:p>
             <a:fld id="{5D1846AD-9252-4647-9435-4C2AC365653A}" type="datetime1">
               <a:rPr lang="en-US" smtClean="0"/>
-              <a:t>8/4/2017</a:t>
+              <a:t>8/6/2017</a:t>
             </a:fld>
             <a:endParaRPr lang="en-US"/>
           </a:p>
@@ -8990,7 +8990,7 @@
           <a:p>
             <a:fld id="{CE56DC10-3561-4063-A6AF-C1CC7A41040A}" type="datetime1">
               <a:rPr lang="en-US" smtClean="0"/>
-              <a:t>8/4/2017</a:t>
+              <a:t>8/6/2017</a:t>
             </a:fld>
             <a:endParaRPr lang="en-US"/>
           </a:p>
@@ -9107,7 +9107,7 @@
           <a:p>
             <a:fld id="{2F7B77F5-1464-4F6B-92A8-64FC8A508293}" type="datetime1">
               <a:rPr lang="en-US" smtClean="0"/>
-              <a:t>8/4/2017</a:t>
+              <a:t>8/6/2017</a:t>
             </a:fld>
             <a:endParaRPr lang="en-US"/>
           </a:p>
@@ -9330,7 +9330,7 @@
           <a:p>
             <a:fld id="{02B3F677-983B-48DB-ADFD-63FE6CBC7FB2}" type="datetime1">
               <a:rPr lang="en-US" smtClean="0"/>
-              <a:t>8/4/2017</a:t>
+              <a:t>8/6/2017</a:t>
             </a:fld>
             <a:endParaRPr lang="en-US"/>
           </a:p>
@@ -9726,7 +9726,7 @@
           <a:p>
             <a:r>
               <a:rPr lang="en-US" dirty="0"/>
-              <a:t>Module 4: Lists</a:t>
+              <a:t>Lists</a:t>
             </a:r>
           </a:p>
         </p:txBody>
@@ -9762,7 +9762,7 @@
           <a:p>
             <a:r>
               <a:rPr lang="en-US" dirty="0"/>
-              <a:t>Combined Module 4 Lessons</a:t>
+              <a:t>Lesson 4.1</a:t>
             </a:r>
           </a:p>
           <a:p>

</xml_diff>

<commit_message>
fixed Will's notes on M03.html, L4.1-4.4, L5.3
</commit_message>
<xml_diff>
--- a/Slides/Lesson 4.1 Lists.pptx
+++ b/Slides/Lesson 4.1 Lists.pptx
@@ -5088,7 +5088,7 @@
             <a:fld id="{CF8F25F6-E1EF-4065-8525-42EDEBD9BD22}" type="datetimeFigureOut">
               <a:rPr lang="en-US" smtClean="0"/>
               <a:pPr/>
-              <a:t>8/6/2017</a:t>
+              <a:t>8/11/2017</a:t>
             </a:fld>
             <a:endParaRPr lang="en-US"/>
           </a:p>
@@ -6241,7 +6241,7 @@
           <a:p>
             <a:fld id="{2F1F79F5-7BEC-496A-AFC7-876E38F64D71}" type="datetime1">
               <a:rPr lang="en-US" smtClean="0"/>
-              <a:t>8/6/2017</a:t>
+              <a:t>8/11/2017</a:t>
             </a:fld>
             <a:endParaRPr lang="en-US"/>
           </a:p>
@@ -6336,7 +6336,7 @@
           <a:p>
             <a:fld id="{0A05703A-7669-4FEA-9056-25299B4D29D4}" type="datetime1">
               <a:rPr lang="en-US" smtClean="0"/>
-              <a:t>8/6/2017</a:t>
+              <a:t>8/11/2017</a:t>
             </a:fld>
             <a:endParaRPr lang="en-US"/>
           </a:p>
@@ -6611,7 +6611,7 @@
           <a:p>
             <a:fld id="{6E5077B5-BB57-49DB-88CA-226A139E5C01}" type="datetime1">
               <a:rPr lang="en-US" smtClean="0"/>
-              <a:t>8/6/2017</a:t>
+              <a:t>8/11/2017</a:t>
             </a:fld>
             <a:endParaRPr lang="en-US"/>
           </a:p>
@@ -6863,7 +6863,7 @@
           <a:p>
             <a:fld id="{C48D9447-CBD6-49A1-89FD-8512A8CF8999}" type="datetime1">
               <a:rPr lang="en-US" smtClean="0"/>
-              <a:t>8/6/2017</a:t>
+              <a:t>8/11/2017</a:t>
             </a:fld>
             <a:endParaRPr lang="en-US"/>
           </a:p>
@@ -7031,7 +7031,7 @@
           <a:p>
             <a:fld id="{A3639A2A-823D-48B7-9ACE-7FAF42870BA9}" type="datetime1">
               <a:rPr lang="en-US" smtClean="0"/>
-              <a:t>8/6/2017</a:t>
+              <a:t>8/11/2017</a:t>
             </a:fld>
             <a:endParaRPr lang="en-US"/>
           </a:p>
@@ -7209,7 +7209,7 @@
           <a:p>
             <a:fld id="{ED1B6996-82E9-463C-972C-7B56056E426C}" type="datetime1">
               <a:rPr lang="en-US" smtClean="0"/>
-              <a:t>8/6/2017</a:t>
+              <a:t>8/11/2017</a:t>
             </a:fld>
             <a:endParaRPr lang="en-US"/>
           </a:p>
@@ -7383,7 +7383,7 @@
           <a:p>
             <a:fld id="{E22ED4DA-448D-4BB1-B935-CC112220207B}" type="datetime1">
               <a:rPr lang="en-US" smtClean="0"/>
-              <a:t>8/6/2017</a:t>
+              <a:t>8/11/2017</a:t>
             </a:fld>
             <a:endParaRPr lang="en-US"/>
           </a:p>
@@ -7556,7 +7556,7 @@
           <a:p>
             <a:fld id="{E22ED4DA-448D-4BB1-B935-CC112220207B}" type="datetime1">
               <a:rPr lang="en-US" smtClean="0"/>
-              <a:t>8/6/2017</a:t>
+              <a:t>8/11/2017</a:t>
             </a:fld>
             <a:endParaRPr lang="en-US"/>
           </a:p>
@@ -7816,7 +7816,7 @@
           <a:p>
             <a:fld id="{FF5D65A6-AB94-4435-B0B7-3743215FA46C}" type="datetime1">
               <a:rPr lang="en-US" smtClean="0"/>
-              <a:t>8/6/2017</a:t>
+              <a:t>8/11/2017</a:t>
             </a:fld>
             <a:endParaRPr lang="en-US"/>
           </a:p>
@@ -7992,7 +7992,7 @@
           <a:p>
             <a:fld id="{FF5D65A6-AB94-4435-B0B7-3743215FA46C}" type="datetime1">
               <a:rPr lang="en-US" smtClean="0"/>
-              <a:t>8/6/2017</a:t>
+              <a:t>8/11/2017</a:t>
             </a:fld>
             <a:endParaRPr lang="en-US"/>
           </a:p>
@@ -8286,7 +8286,7 @@
           <a:p>
             <a:fld id="{7C193DC4-6EF0-48C9-B29C-616106A645E1}" type="datetime1">
               <a:rPr lang="en-US" smtClean="0"/>
-              <a:t>8/6/2017</a:t>
+              <a:t>8/11/2017</a:t>
             </a:fld>
             <a:endParaRPr lang="en-US"/>
           </a:p>
@@ -8571,7 +8571,7 @@
           <a:p>
             <a:fld id="{5D1846AD-9252-4647-9435-4C2AC365653A}" type="datetime1">
               <a:rPr lang="en-US" smtClean="0"/>
-              <a:t>8/6/2017</a:t>
+              <a:t>8/11/2017</a:t>
             </a:fld>
             <a:endParaRPr lang="en-US"/>
           </a:p>
@@ -8990,7 +8990,7 @@
           <a:p>
             <a:fld id="{CE56DC10-3561-4063-A6AF-C1CC7A41040A}" type="datetime1">
               <a:rPr lang="en-US" smtClean="0"/>
-              <a:t>8/6/2017</a:t>
+              <a:t>8/11/2017</a:t>
             </a:fld>
             <a:endParaRPr lang="en-US"/>
           </a:p>
@@ -9107,7 +9107,7 @@
           <a:p>
             <a:fld id="{2F7B77F5-1464-4F6B-92A8-64FC8A508293}" type="datetime1">
               <a:rPr lang="en-US" smtClean="0"/>
-              <a:t>8/6/2017</a:t>
+              <a:t>8/11/2017</a:t>
             </a:fld>
             <a:endParaRPr lang="en-US"/>
           </a:p>
@@ -9330,7 +9330,7 @@
           <a:p>
             <a:fld id="{02B3F677-983B-48DB-ADFD-63FE6CBC7FB2}" type="datetime1">
               <a:rPr lang="en-US" smtClean="0"/>
-              <a:t>8/6/2017</a:t>
+              <a:t>8/11/2017</a:t>
             </a:fld>
             <a:endParaRPr lang="en-US"/>
           </a:p>
@@ -9993,6 +9993,61 @@
       </p:grpSpPr>
       <p:sp>
         <p:nvSpPr>
+          <p:cNvPr id="7" name="Rectangle 6"/>
+          <p:cNvSpPr/>
+          <p:nvPr/>
+        </p:nvSpPr>
+        <p:spPr>
+          <a:xfrm>
+            <a:off x="735496" y="3826565"/>
+            <a:ext cx="7792278" cy="1629672"/>
+          </a:xfrm>
+          <a:prstGeom prst="rect">
+            <a:avLst/>
+          </a:prstGeom>
+          <a:solidFill>
+            <a:schemeClr val="bg1">
+              <a:lumMod val="85000"/>
+            </a:schemeClr>
+          </a:solidFill>
+          <a:ln>
+            <a:noFill/>
+          </a:ln>
+        </p:spPr>
+        <p:style>
+          <a:lnRef idx="2">
+            <a:schemeClr val="accent1"/>
+          </a:lnRef>
+          <a:fillRef idx="1">
+            <a:schemeClr val="lt1"/>
+          </a:fillRef>
+          <a:effectRef idx="0">
+            <a:schemeClr val="accent1"/>
+          </a:effectRef>
+          <a:fontRef idx="minor">
+            <a:schemeClr val="dk1"/>
+          </a:fontRef>
+        </p:style>
+        <p:txBody>
+          <a:bodyPr rot="0" spcFirstLastPara="0" vertOverflow="overflow" horzOverflow="overflow" vert="horz" wrap="square" lIns="91440" tIns="45720" rIns="91440" bIns="45720" numCol="1" spcCol="0" rtlCol="0" fromWordArt="0" anchor="ctr" anchorCtr="0" forceAA="0" compatLnSpc="1">
+            <a:prstTxWarp prst="textNoShape">
+              <a:avLst/>
+            </a:prstTxWarp>
+            <a:noAutofit/>
+          </a:bodyPr>
+          <a:lstStyle/>
+          <a:p>
+            <a:pPr algn="ctr"/>
+            <a:endParaRPr lang="en-US" dirty="0">
+              <a:solidFill>
+                <a:schemeClr val="tx1"/>
+              </a:solidFill>
+            </a:endParaRPr>
+          </a:p>
+        </p:txBody>
+      </p:sp>
+      <p:sp>
+        <p:nvSpPr>
           <p:cNvPr id="2" name="Title 1"/>
           <p:cNvSpPr>
             <a:spLocks noGrp="1"/>
@@ -10122,7 +10177,7 @@
                 <a:latin typeface="Consolas" pitchFamily="49" charset="0"/>
                 <a:cs typeface="Consolas" pitchFamily="49" charset="0"/>
               </a:rPr>
-              <a:t>    (cons (cons "3" empty)  </a:t>
+              <a:t>  (cons (cons "3" empty)  </a:t>
             </a:r>
           </a:p>
           <a:p>
@@ -10134,7 +10189,7 @@
                 <a:latin typeface="Consolas" pitchFamily="49" charset="0"/>
                 <a:cs typeface="Consolas" pitchFamily="49" charset="0"/>
               </a:rPr>
-              <a:t>          (cons "2" (cons "3" empty)))</a:t>
+              <a:t>        (cons "2" (cons "3" empty)))</a:t>
             </a:r>
           </a:p>
         </p:txBody>

</xml_diff>